<commit_message>
Update README and figure
</commit_message>
<xml_diff>
--- a/figures.pptx
+++ b/figures.pptx
@@ -4654,7 +4654,7 @@
             <a:pPr algn="ctr"/>
             <a:r>
               <a:rPr lang="en-US" altLang="ja-JP" sz="2800" dirty="0"/>
-              <a:t>1</a:t>
+              <a:t>0</a:t>
             </a:r>
             <a:endParaRPr kumimoji="1" lang="ja-JP" altLang="en-US" sz="2800" dirty="0"/>
           </a:p>
@@ -4716,7 +4716,7 @@
             <a:pPr algn="ctr"/>
             <a:r>
               <a:rPr lang="en-US" altLang="ja-JP" sz="2800" dirty="0"/>
-              <a:t>2</a:t>
+              <a:t>1</a:t>
             </a:r>
             <a:endParaRPr kumimoji="1" lang="ja-JP" altLang="en-US" sz="2800" dirty="0"/>
           </a:p>
@@ -4746,8 +4746,8 @@
           <a:p>
             <a:pPr algn="ctr"/>
             <a:r>
-              <a:rPr lang="en-US" altLang="ja-JP" sz="2800" dirty="0" smtClean="0"/>
-              <a:t>4</a:t>
+              <a:rPr lang="en-US" altLang="ja-JP" sz="2800" dirty="0"/>
+              <a:t>3</a:t>
             </a:r>
             <a:endParaRPr kumimoji="1" lang="ja-JP" altLang="en-US" sz="2800" dirty="0"/>
           </a:p>
@@ -4840,7 +4840,7 @@
             <a:pPr algn="ctr"/>
             <a:r>
               <a:rPr lang="en-US" altLang="ja-JP" sz="2800" dirty="0"/>
-              <a:t>5</a:t>
+              <a:t>3</a:t>
             </a:r>
             <a:endParaRPr kumimoji="1" lang="ja-JP" altLang="en-US" sz="2800" dirty="0"/>
           </a:p>
@@ -4871,7 +4871,7 @@
             <a:pPr algn="ctr"/>
             <a:r>
               <a:rPr lang="en-US" altLang="ja-JP" sz="2800" dirty="0"/>
-              <a:t>6</a:t>
+              <a:t>3</a:t>
             </a:r>
             <a:endParaRPr kumimoji="1" lang="ja-JP" altLang="en-US" sz="2800" dirty="0"/>
           </a:p>
@@ -5247,7 +5247,7 @@
             <a:pPr algn="ctr"/>
             <a:r>
               <a:rPr lang="en-US" altLang="ja-JP" sz="2800" dirty="0"/>
-              <a:t>1</a:t>
+              <a:t>#</a:t>
             </a:r>
             <a:endParaRPr kumimoji="1" lang="ja-JP" altLang="en-US" sz="2800" dirty="0"/>
           </a:p>
@@ -5277,8 +5277,8 @@
           <a:p>
             <a:pPr algn="ctr"/>
             <a:r>
-              <a:rPr lang="en-US" altLang="ja-JP" sz="2800" dirty="0"/>
-              <a:t>2</a:t>
+              <a:rPr lang="en-US" altLang="ja-JP" sz="2800" dirty="0" smtClean="0"/>
+              <a:t>#</a:t>
             </a:r>
             <a:endParaRPr kumimoji="1" lang="ja-JP" altLang="en-US" sz="2800" dirty="0"/>
           </a:p>
@@ -5308,8 +5308,8 @@
           <a:p>
             <a:pPr algn="ctr"/>
             <a:r>
-              <a:rPr lang="en-US" altLang="ja-JP" sz="2800" dirty="0"/>
-              <a:t>3</a:t>
+              <a:rPr lang="en-US" altLang="ja-JP" sz="2800" dirty="0" smtClean="0"/>
+              <a:t>#</a:t>
             </a:r>
             <a:endParaRPr kumimoji="1" lang="ja-JP" altLang="en-US" sz="2800" dirty="0"/>
           </a:p>
@@ -5509,7 +5509,7 @@
         </p:nvSpPr>
         <p:spPr>
           <a:xfrm>
-            <a:off x="1853538" y="902784"/>
+            <a:off x="1832396" y="1266171"/>
             <a:ext cx="418375" cy="418375"/>
           </a:xfrm>
           <a:prstGeom prst="ellipse">
@@ -5554,7 +5554,7 @@
         </p:nvCxnSpPr>
         <p:spPr>
           <a:xfrm flipH="1">
-            <a:off x="1411621" y="1259889"/>
+            <a:off x="1390479" y="1623276"/>
             <a:ext cx="503187" cy="300625"/>
           </a:xfrm>
           <a:prstGeom prst="line">
@@ -5587,7 +5587,7 @@
         </p:nvSpPr>
         <p:spPr>
           <a:xfrm>
-            <a:off x="1202433" y="1560514"/>
+            <a:off x="1181291" y="1923901"/>
             <a:ext cx="418375" cy="418375"/>
           </a:xfrm>
           <a:prstGeom prst="ellipse">
@@ -5629,7 +5629,7 @@
         </p:nvSpPr>
         <p:spPr>
           <a:xfrm>
-            <a:off x="1309207" y="894663"/>
+            <a:off x="1288065" y="1258050"/>
             <a:ext cx="432090" cy="523220"/>
           </a:xfrm>
           <a:prstGeom prst="rect">
@@ -5663,7 +5663,7 @@
         </p:nvCxnSpPr>
         <p:spPr>
           <a:xfrm flipH="1">
-            <a:off x="556462" y="1917619"/>
+            <a:off x="535320" y="2281006"/>
             <a:ext cx="707241" cy="482437"/>
           </a:xfrm>
           <a:prstGeom prst="line">
@@ -5696,7 +5696,7 @@
         </p:nvSpPr>
         <p:spPr>
           <a:xfrm>
-            <a:off x="347274" y="2400056"/>
+            <a:off x="326132" y="2763443"/>
             <a:ext cx="418375" cy="418375"/>
           </a:xfrm>
           <a:prstGeom prst="ellipse">
@@ -5738,7 +5738,7 @@
         </p:nvSpPr>
         <p:spPr>
           <a:xfrm>
-            <a:off x="551890" y="1632545"/>
+            <a:off x="530748" y="1995932"/>
             <a:ext cx="463107" cy="523220"/>
           </a:xfrm>
           <a:prstGeom prst="rect">
@@ -5772,7 +5772,7 @@
         </p:nvCxnSpPr>
         <p:spPr>
           <a:xfrm flipH="1">
-            <a:off x="1411231" y="1978889"/>
+            <a:off x="1390089" y="2342276"/>
             <a:ext cx="390" cy="675929"/>
           </a:xfrm>
           <a:prstGeom prst="line">
@@ -5805,7 +5805,7 @@
         </p:nvSpPr>
         <p:spPr>
           <a:xfrm>
-            <a:off x="1202043" y="2654818"/>
+            <a:off x="1180901" y="3018205"/>
             <a:ext cx="418375" cy="418375"/>
           </a:xfrm>
           <a:prstGeom prst="ellipse">
@@ -5847,7 +5847,7 @@
         </p:nvSpPr>
         <p:spPr>
           <a:xfrm>
-            <a:off x="929741" y="2042110"/>
+            <a:off x="908599" y="2405497"/>
             <a:ext cx="463107" cy="523220"/>
           </a:xfrm>
           <a:prstGeom prst="rect">
@@ -5881,7 +5881,7 @@
         </p:nvCxnSpPr>
         <p:spPr>
           <a:xfrm>
-            <a:off x="1559538" y="1917619"/>
+            <a:off x="1538396" y="2281006"/>
             <a:ext cx="595752" cy="482436"/>
           </a:xfrm>
           <a:prstGeom prst="line">
@@ -5914,7 +5914,7 @@
         </p:nvSpPr>
         <p:spPr>
           <a:xfrm>
-            <a:off x="1946102" y="2400055"/>
+            <a:off x="1924960" y="2763442"/>
             <a:ext cx="418375" cy="418375"/>
           </a:xfrm>
           <a:prstGeom prst="ellipse">
@@ -5956,7 +5956,7 @@
         </p:nvSpPr>
         <p:spPr>
           <a:xfrm>
-            <a:off x="1780935" y="1599999"/>
+            <a:off x="1759793" y="1963386"/>
             <a:ext cx="463107" cy="523220"/>
           </a:xfrm>
           <a:prstGeom prst="rect">
@@ -5981,14 +5981,14 @@
       </p:sp>
       <p:sp>
         <p:nvSpPr>
-          <p:cNvPr id="98" name="テキスト ボックス 97"/>
+          <p:cNvPr id="111" name="テキスト ボックス 110"/>
           <p:cNvSpPr txBox="1"/>
           <p:nvPr/>
         </p:nvSpPr>
         <p:spPr>
           <a:xfrm>
-            <a:off x="258303" y="3237316"/>
-            <a:ext cx="587173" cy="523220"/>
+            <a:off x="1110598" y="1899836"/>
+            <a:ext cx="564854" cy="461665"/>
           </a:xfrm>
           <a:prstGeom prst="rect">
             <a:avLst/>
@@ -6003,23 +6003,23 @@
           <a:p>
             <a:pPr algn="ctr"/>
             <a:r>
-              <a:rPr lang="en-US" altLang="ja-JP" sz="2800" dirty="0" smtClean="0"/>
-              <a:t>1</a:t>
-            </a:r>
-            <a:endParaRPr kumimoji="1" lang="ja-JP" altLang="en-US" sz="2800" dirty="0"/>
-          </a:p>
-        </p:txBody>
-      </p:sp>
-      <p:sp>
-        <p:nvSpPr>
-          <p:cNvPr id="99" name="テキスト ボックス 98"/>
+              <a:rPr lang="en-US" altLang="ja-JP" sz="2400" dirty="0" smtClean="0"/>
+              <a:t>3</a:t>
+            </a:r>
+            <a:endParaRPr kumimoji="1" lang="ja-JP" altLang="en-US" sz="2400" dirty="0"/>
+          </a:p>
+        </p:txBody>
+      </p:sp>
+      <p:sp>
+        <p:nvSpPr>
+          <p:cNvPr id="112" name="テキスト ボックス 111"/>
           <p:cNvSpPr txBox="1"/>
           <p:nvPr/>
         </p:nvSpPr>
         <p:spPr>
           <a:xfrm>
-            <a:off x="1117643" y="3385747"/>
-            <a:ext cx="587173" cy="523220"/>
+            <a:off x="252123" y="2749167"/>
+            <a:ext cx="564854" cy="461665"/>
           </a:xfrm>
           <a:prstGeom prst="rect">
             <a:avLst/>
@@ -6034,23 +6034,23 @@
           <a:p>
             <a:pPr algn="ctr"/>
             <a:r>
-              <a:rPr lang="en-US" altLang="ja-JP" sz="2800" dirty="0" smtClean="0"/>
-              <a:t>2</a:t>
-            </a:r>
-            <a:endParaRPr kumimoji="1" lang="ja-JP" altLang="en-US" sz="2800" dirty="0"/>
-          </a:p>
-        </p:txBody>
-      </p:sp>
-      <p:sp>
-        <p:nvSpPr>
-          <p:cNvPr id="100" name="テキスト ボックス 99"/>
+              <a:rPr lang="en-US" altLang="ja-JP" sz="2400" dirty="0"/>
+              <a:t>4</a:t>
+            </a:r>
+            <a:endParaRPr kumimoji="1" lang="ja-JP" altLang="en-US" sz="2400" dirty="0"/>
+          </a:p>
+        </p:txBody>
+      </p:sp>
+      <p:sp>
+        <p:nvSpPr>
+          <p:cNvPr id="113" name="テキスト ボックス 112"/>
           <p:cNvSpPr txBox="1"/>
           <p:nvPr/>
         </p:nvSpPr>
         <p:spPr>
           <a:xfrm>
-            <a:off x="1869551" y="3167390"/>
-            <a:ext cx="587173" cy="523220"/>
+            <a:off x="1109030" y="3001399"/>
+            <a:ext cx="564854" cy="461665"/>
           </a:xfrm>
           <a:prstGeom prst="rect">
             <a:avLst/>
@@ -6065,22 +6065,22 @@
           <a:p>
             <a:pPr algn="ctr"/>
             <a:r>
-              <a:rPr lang="en-US" altLang="ja-JP" sz="2800" dirty="0" smtClean="0"/>
-              <a:t>3</a:t>
-            </a:r>
-            <a:endParaRPr kumimoji="1" lang="ja-JP" altLang="en-US" sz="2800" dirty="0"/>
-          </a:p>
-        </p:txBody>
-      </p:sp>
-      <p:sp>
-        <p:nvSpPr>
-          <p:cNvPr id="111" name="テキスト ボックス 110"/>
+              <a:rPr lang="en-US" altLang="ja-JP" sz="2400" dirty="0" smtClean="0"/>
+              <a:t>5</a:t>
+            </a:r>
+            <a:endParaRPr kumimoji="1" lang="ja-JP" altLang="en-US" sz="2400" dirty="0"/>
+          </a:p>
+        </p:txBody>
+      </p:sp>
+      <p:sp>
+        <p:nvSpPr>
+          <p:cNvPr id="114" name="テキスト ボックス 113"/>
           <p:cNvSpPr txBox="1"/>
           <p:nvPr/>
         </p:nvSpPr>
         <p:spPr>
           <a:xfrm>
-            <a:off x="1131740" y="1536449"/>
+            <a:off x="1854190" y="2745168"/>
             <a:ext cx="564854" cy="461665"/>
           </a:xfrm>
           <a:prstGeom prst="rect">
@@ -6096,99 +6096,6 @@
           <a:p>
             <a:pPr algn="ctr"/>
             <a:r>
-              <a:rPr lang="en-US" altLang="ja-JP" sz="2400" dirty="0" smtClean="0"/>
-              <a:t>3</a:t>
-            </a:r>
-            <a:endParaRPr kumimoji="1" lang="ja-JP" altLang="en-US" sz="2400" dirty="0"/>
-          </a:p>
-        </p:txBody>
-      </p:sp>
-      <p:sp>
-        <p:nvSpPr>
-          <p:cNvPr id="112" name="テキスト ボックス 111"/>
-          <p:cNvSpPr txBox="1"/>
-          <p:nvPr/>
-        </p:nvSpPr>
-        <p:spPr>
-          <a:xfrm>
-            <a:off x="273265" y="2385780"/>
-            <a:ext cx="564854" cy="461665"/>
-          </a:xfrm>
-          <a:prstGeom prst="rect">
-            <a:avLst/>
-          </a:prstGeom>
-          <a:noFill/>
-        </p:spPr>
-        <p:txBody>
-          <a:bodyPr wrap="square" rtlCol="0">
-            <a:spAutoFit/>
-          </a:bodyPr>
-          <a:lstStyle/>
-          <a:p>
-            <a:pPr algn="ctr"/>
-            <a:r>
-              <a:rPr lang="en-US" altLang="ja-JP" sz="2400" dirty="0"/>
-              <a:t>4</a:t>
-            </a:r>
-            <a:endParaRPr kumimoji="1" lang="ja-JP" altLang="en-US" sz="2400" dirty="0"/>
-          </a:p>
-        </p:txBody>
-      </p:sp>
-      <p:sp>
-        <p:nvSpPr>
-          <p:cNvPr id="113" name="テキスト ボックス 112"/>
-          <p:cNvSpPr txBox="1"/>
-          <p:nvPr/>
-        </p:nvSpPr>
-        <p:spPr>
-          <a:xfrm>
-            <a:off x="1130172" y="2638012"/>
-            <a:ext cx="564854" cy="461665"/>
-          </a:xfrm>
-          <a:prstGeom prst="rect">
-            <a:avLst/>
-          </a:prstGeom>
-          <a:noFill/>
-        </p:spPr>
-        <p:txBody>
-          <a:bodyPr wrap="square" rtlCol="0">
-            <a:spAutoFit/>
-          </a:bodyPr>
-          <a:lstStyle/>
-          <a:p>
-            <a:pPr algn="ctr"/>
-            <a:r>
-              <a:rPr lang="en-US" altLang="ja-JP" sz="2400" dirty="0" smtClean="0"/>
-              <a:t>5</a:t>
-            </a:r>
-            <a:endParaRPr kumimoji="1" lang="ja-JP" altLang="en-US" sz="2400" dirty="0"/>
-          </a:p>
-        </p:txBody>
-      </p:sp>
-      <p:sp>
-        <p:nvSpPr>
-          <p:cNvPr id="114" name="テキスト ボックス 113"/>
-          <p:cNvSpPr txBox="1"/>
-          <p:nvPr/>
-        </p:nvSpPr>
-        <p:spPr>
-          <a:xfrm>
-            <a:off x="1875332" y="2381781"/>
-            <a:ext cx="564854" cy="461665"/>
-          </a:xfrm>
-          <a:prstGeom prst="rect">
-            <a:avLst/>
-          </a:prstGeom>
-          <a:noFill/>
-        </p:spPr>
-        <p:txBody>
-          <a:bodyPr wrap="square" rtlCol="0">
-            <a:spAutoFit/>
-          </a:bodyPr>
-          <a:lstStyle/>
-          <a:p>
-            <a:pPr algn="ctr"/>
-            <a:r>
               <a:rPr lang="en-US" altLang="ja-JP" sz="2400" dirty="0"/>
               <a:t>6</a:t>
             </a:r>
@@ -6196,126 +6103,6 @@
           </a:p>
         </p:txBody>
       </p:sp>
-      <p:cxnSp>
-        <p:nvCxnSpPr>
-          <p:cNvPr id="115" name="直線コネクタ 114"/>
-          <p:cNvCxnSpPr>
-            <a:stCxn id="112" idx="2"/>
-            <a:endCxn id="98" idx="0"/>
-          </p:cNvCxnSpPr>
-          <p:nvPr/>
-        </p:nvCxnSpPr>
-        <p:spPr>
-          <a:xfrm flipH="1">
-            <a:off x="551890" y="2847445"/>
-            <a:ext cx="3802" cy="389871"/>
-          </a:xfrm>
-          <a:prstGeom prst="line">
-            <a:avLst/>
-          </a:prstGeom>
-          <a:ln w="25400">
-            <a:solidFill>
-              <a:srgbClr val="FF0000"/>
-            </a:solidFill>
-            <a:prstDash val="sysDot"/>
-            <a:tailEnd type="arrow"/>
-          </a:ln>
-        </p:spPr>
-        <p:style>
-          <a:lnRef idx="1">
-            <a:schemeClr val="accent1"/>
-          </a:lnRef>
-          <a:fillRef idx="0">
-            <a:schemeClr val="accent1"/>
-          </a:fillRef>
-          <a:effectRef idx="0">
-            <a:schemeClr val="accent1"/>
-          </a:effectRef>
-          <a:fontRef idx="minor">
-            <a:schemeClr val="tx1"/>
-          </a:fontRef>
-        </p:style>
-      </p:cxnSp>
-      <p:cxnSp>
-        <p:nvCxnSpPr>
-          <p:cNvPr id="116" name="直線コネクタ 115"/>
-          <p:cNvCxnSpPr>
-            <a:stCxn id="113" idx="2"/>
-            <a:endCxn id="99" idx="0"/>
-          </p:cNvCxnSpPr>
-          <p:nvPr/>
-        </p:nvCxnSpPr>
-        <p:spPr>
-          <a:xfrm flipH="1">
-            <a:off x="1411230" y="3099677"/>
-            <a:ext cx="1369" cy="286070"/>
-          </a:xfrm>
-          <a:prstGeom prst="line">
-            <a:avLst/>
-          </a:prstGeom>
-          <a:ln w="25400">
-            <a:solidFill>
-              <a:srgbClr val="FF0000"/>
-            </a:solidFill>
-            <a:prstDash val="sysDot"/>
-            <a:tailEnd type="arrow"/>
-          </a:ln>
-        </p:spPr>
-        <p:style>
-          <a:lnRef idx="1">
-            <a:schemeClr val="accent1"/>
-          </a:lnRef>
-          <a:fillRef idx="0">
-            <a:schemeClr val="accent1"/>
-          </a:fillRef>
-          <a:effectRef idx="0">
-            <a:schemeClr val="accent1"/>
-          </a:effectRef>
-          <a:fontRef idx="minor">
-            <a:schemeClr val="tx1"/>
-          </a:fontRef>
-        </p:style>
-      </p:cxnSp>
-      <p:cxnSp>
-        <p:nvCxnSpPr>
-          <p:cNvPr id="117" name="直線コネクタ 116"/>
-          <p:cNvCxnSpPr>
-            <a:stCxn id="114" idx="2"/>
-            <a:endCxn id="100" idx="0"/>
-          </p:cNvCxnSpPr>
-          <p:nvPr/>
-        </p:nvCxnSpPr>
-        <p:spPr>
-          <a:xfrm>
-            <a:off x="2157759" y="2843446"/>
-            <a:ext cx="5379" cy="323944"/>
-          </a:xfrm>
-          <a:prstGeom prst="line">
-            <a:avLst/>
-          </a:prstGeom>
-          <a:ln w="25400">
-            <a:solidFill>
-              <a:srgbClr val="FF0000"/>
-            </a:solidFill>
-            <a:prstDash val="sysDot"/>
-            <a:tailEnd type="arrow"/>
-          </a:ln>
-        </p:spPr>
-        <p:style>
-          <a:lnRef idx="1">
-            <a:schemeClr val="accent1"/>
-          </a:lnRef>
-          <a:fillRef idx="0">
-            <a:schemeClr val="accent1"/>
-          </a:fillRef>
-          <a:effectRef idx="0">
-            <a:schemeClr val="accent1"/>
-          </a:effectRef>
-          <a:fontRef idx="minor">
-            <a:schemeClr val="tx1"/>
-          </a:fontRef>
-        </p:style>
-      </p:cxnSp>
       <p:sp>
         <p:nvSpPr>
           <p:cNvPr id="126" name="テキスト ボックス 125"/>
@@ -6324,7 +6111,7 @@
         </p:nvSpPr>
         <p:spPr>
           <a:xfrm>
-            <a:off x="1780935" y="876090"/>
+            <a:off x="1759793" y="1239477"/>
             <a:ext cx="564854" cy="461665"/>
           </a:xfrm>
           <a:prstGeom prst="rect">

</xml_diff>